<commit_message>
Added examples of team conflicts
</commit_message>
<xml_diff>
--- a/TeamManagement/Report.pptx
+++ b/TeamManagement/Report.pptx
@@ -5,15 +5,19 @@
     <p:sldMasterId id="2147483648" r:id="rId1"/>
   </p:sldMasterIdLst>
   <p:notesMasterIdLst>
-    <p:notesMasterId r:id="rId8"/>
+    <p:notesMasterId r:id="rId12"/>
   </p:notesMasterIdLst>
   <p:sldIdLst>
     <p:sldId id="256" r:id="rId2"/>
     <p:sldId id="257" r:id="rId3"/>
     <p:sldId id="258" r:id="rId4"/>
     <p:sldId id="259" r:id="rId5"/>
-    <p:sldId id="260" r:id="rId6"/>
-    <p:sldId id="261" r:id="rId7"/>
+    <p:sldId id="262" r:id="rId6"/>
+    <p:sldId id="263" r:id="rId7"/>
+    <p:sldId id="264" r:id="rId8"/>
+    <p:sldId id="265" r:id="rId9"/>
+    <p:sldId id="260" r:id="rId10"/>
+    <p:sldId id="261" r:id="rId11"/>
   </p:sldIdLst>
   <p:sldSz cx="12192000" cy="6858000"/>
   <p:notesSz cx="6858000" cy="9144000"/>
@@ -202,7 +206,7 @@
           <a:p>
             <a:fld id="{B76B641F-C7E1-4E15-B56E-E525FA5EED94}" type="datetimeFigureOut">
               <a:rPr lang="ru-RU" smtClean="0"/>
-              <a:t>01.05.2025</a:t>
+              <a:t>18.05.2025</a:t>
             </a:fld>
             <a:endParaRPr lang="ru-RU"/>
           </a:p>
@@ -685,7 +689,7 @@
           <a:p>
             <a:fld id="{74D17070-512D-4E4F-98F9-DE4644DFEE47}" type="datetimeFigureOut">
               <a:rPr lang="ru-RU" smtClean="0"/>
-              <a:t>01.05.2025</a:t>
+              <a:t>18.05.2025</a:t>
             </a:fld>
             <a:endParaRPr lang="ru-RU"/>
           </a:p>
@@ -855,7 +859,7 @@
           <a:p>
             <a:fld id="{74D17070-512D-4E4F-98F9-DE4644DFEE47}" type="datetimeFigureOut">
               <a:rPr lang="ru-RU" smtClean="0"/>
-              <a:t>01.05.2025</a:t>
+              <a:t>18.05.2025</a:t>
             </a:fld>
             <a:endParaRPr lang="ru-RU"/>
           </a:p>
@@ -1035,7 +1039,7 @@
           <a:p>
             <a:fld id="{74D17070-512D-4E4F-98F9-DE4644DFEE47}" type="datetimeFigureOut">
               <a:rPr lang="ru-RU" smtClean="0"/>
-              <a:t>01.05.2025</a:t>
+              <a:t>18.05.2025</a:t>
             </a:fld>
             <a:endParaRPr lang="ru-RU"/>
           </a:p>
@@ -1205,7 +1209,7 @@
           <a:p>
             <a:fld id="{74D17070-512D-4E4F-98F9-DE4644DFEE47}" type="datetimeFigureOut">
               <a:rPr lang="ru-RU" smtClean="0"/>
-              <a:t>01.05.2025</a:t>
+              <a:t>18.05.2025</a:t>
             </a:fld>
             <a:endParaRPr lang="ru-RU"/>
           </a:p>
@@ -1451,7 +1455,7 @@
           <a:p>
             <a:fld id="{74D17070-512D-4E4F-98F9-DE4644DFEE47}" type="datetimeFigureOut">
               <a:rPr lang="ru-RU" smtClean="0"/>
-              <a:t>01.05.2025</a:t>
+              <a:t>18.05.2025</a:t>
             </a:fld>
             <a:endParaRPr lang="ru-RU"/>
           </a:p>
@@ -1683,7 +1687,7 @@
           <a:p>
             <a:fld id="{74D17070-512D-4E4F-98F9-DE4644DFEE47}" type="datetimeFigureOut">
               <a:rPr lang="ru-RU" smtClean="0"/>
-              <a:t>01.05.2025</a:t>
+              <a:t>18.05.2025</a:t>
             </a:fld>
             <a:endParaRPr lang="ru-RU"/>
           </a:p>
@@ -2050,7 +2054,7 @@
           <a:p>
             <a:fld id="{74D17070-512D-4E4F-98F9-DE4644DFEE47}" type="datetimeFigureOut">
               <a:rPr lang="ru-RU" smtClean="0"/>
-              <a:t>01.05.2025</a:t>
+              <a:t>18.05.2025</a:t>
             </a:fld>
             <a:endParaRPr lang="ru-RU"/>
           </a:p>
@@ -2168,7 +2172,7 @@
           <a:p>
             <a:fld id="{74D17070-512D-4E4F-98F9-DE4644DFEE47}" type="datetimeFigureOut">
               <a:rPr lang="ru-RU" smtClean="0"/>
-              <a:t>01.05.2025</a:t>
+              <a:t>18.05.2025</a:t>
             </a:fld>
             <a:endParaRPr lang="ru-RU"/>
           </a:p>
@@ -2263,7 +2267,7 @@
           <a:p>
             <a:fld id="{74D17070-512D-4E4F-98F9-DE4644DFEE47}" type="datetimeFigureOut">
               <a:rPr lang="ru-RU" smtClean="0"/>
-              <a:t>01.05.2025</a:t>
+              <a:t>18.05.2025</a:t>
             </a:fld>
             <a:endParaRPr lang="ru-RU"/>
           </a:p>
@@ -2540,7 +2544,7 @@
           <a:p>
             <a:fld id="{74D17070-512D-4E4F-98F9-DE4644DFEE47}" type="datetimeFigureOut">
               <a:rPr lang="ru-RU" smtClean="0"/>
-              <a:t>01.05.2025</a:t>
+              <a:t>18.05.2025</a:t>
             </a:fld>
             <a:endParaRPr lang="ru-RU"/>
           </a:p>
@@ -2793,7 +2797,7 @@
           <a:p>
             <a:fld id="{74D17070-512D-4E4F-98F9-DE4644DFEE47}" type="datetimeFigureOut">
               <a:rPr lang="ru-RU" smtClean="0"/>
-              <a:t>01.05.2025</a:t>
+              <a:t>18.05.2025</a:t>
             </a:fld>
             <a:endParaRPr lang="ru-RU"/>
           </a:p>
@@ -3006,7 +3010,7 @@
           <a:p>
             <a:fld id="{74D17070-512D-4E4F-98F9-DE4644DFEE47}" type="datetimeFigureOut">
               <a:rPr lang="ru-RU" smtClean="0"/>
-              <a:t>01.05.2025</a:t>
+              <a:t>18.05.2025</a:t>
             </a:fld>
             <a:endParaRPr lang="ru-RU"/>
           </a:p>
@@ -3513,7 +3517,6 @@
               <a:rPr lang="ru-RU" sz="2100" dirty="0"/>
               <a:t>Информационные технологии и системы управления</a:t>
             </a:r>
-            <a:endParaRPr lang="ru-RU" sz="2100" dirty="0"/>
           </a:p>
           <a:p>
             <a:pPr>
@@ -3523,11 +3526,7 @@
             </a:pPr>
             <a:r>
               <a:rPr lang="ru-RU" sz="2100" dirty="0" smtClean="0"/>
-              <a:t>Кафедра </a:t>
-            </a:r>
-            <a:r>
-              <a:rPr lang="ru-RU" sz="2100" dirty="0" smtClean="0"/>
-              <a:t>организации </a:t>
+              <a:t>Кафедра организации </a:t>
             </a:r>
             <a:r>
               <a:rPr lang="ru-RU" sz="2100" dirty="0"/>
@@ -3583,7 +3582,6 @@
               <a:rPr lang="ru-RU" dirty="0"/>
               <a:t>«Организация работы коллектива»</a:t>
             </a:r>
-            <a:endParaRPr lang="ru-RU" dirty="0"/>
           </a:p>
           <a:p>
             <a:pPr>
@@ -3622,7 +3620,6 @@
               <a:rPr lang="ru-RU" dirty="0"/>
               <a:t>отношениями на предприятии»</a:t>
             </a:r>
-            <a:endParaRPr lang="ru-RU" dirty="0"/>
           </a:p>
           <a:p>
             <a:pPr>
@@ -3686,11 +3683,7 @@
             </a:r>
             <a:r>
               <a:rPr lang="ru-RU" sz="2100" dirty="0" smtClean="0"/>
-              <a:t>к.т.н</a:t>
-            </a:r>
-            <a:r>
-              <a:rPr lang="ru-RU" sz="2100" dirty="0" smtClean="0"/>
-              <a:t>., </a:t>
+              <a:t>к.т.н., </a:t>
             </a:r>
             <a:r>
               <a:rPr lang="ru-RU" sz="2100" dirty="0"/>
@@ -3698,11 +3691,7 @@
             </a:r>
             <a:r>
               <a:rPr lang="ru-RU" sz="2100" dirty="0" smtClean="0"/>
-              <a:t>.       </a:t>
-            </a:r>
-            <a:r>
-              <a:rPr lang="ru-RU" sz="2100" dirty="0" smtClean="0"/>
-              <a:t>                                                                Иванова И.В.</a:t>
+              <a:t>.                                                                       Иванова И.В.</a:t>
             </a:r>
             <a:endParaRPr lang="ru-RU" sz="2100" dirty="0"/>
           </a:p>
@@ -3745,6 +3734,160 @@
     <p:extLst>
       <p:ext uri="{BB962C8B-B14F-4D97-AF65-F5344CB8AC3E}">
         <p14:creationId xmlns:p14="http://schemas.microsoft.com/office/powerpoint/2010/main" val="810670126"/>
+      </p:ext>
+    </p:extLst>
+  </p:cSld>
+  <p:clrMapOvr>
+    <a:masterClrMapping/>
+  </p:clrMapOvr>
+  <p:timing>
+    <p:tnLst>
+      <p:par>
+        <p:cTn id="1" dur="indefinite" restart="never" nodeType="tmRoot"/>
+      </p:par>
+    </p:tnLst>
+  </p:timing>
+</p:sld>
+</file>
+
+<file path=ppt/slides/slide10.xml><?xml version="1.0" encoding="utf-8"?>
+<p:sld xmlns:a="http://schemas.openxmlformats.org/drawingml/2006/main" xmlns:r="http://schemas.openxmlformats.org/officeDocument/2006/relationships" xmlns:p="http://schemas.openxmlformats.org/presentationml/2006/main">
+  <p:cSld>
+    <p:spTree>
+      <p:nvGrpSpPr>
+        <p:cNvPr id="1" name=""/>
+        <p:cNvGrpSpPr/>
+        <p:nvPr/>
+      </p:nvGrpSpPr>
+      <p:grpSpPr>
+        <a:xfrm>
+          <a:off x="0" y="0"/>
+          <a:ext cx="0" cy="0"/>
+          <a:chOff x="0" y="0"/>
+          <a:chExt cx="0" cy="0"/>
+        </a:xfrm>
+      </p:grpSpPr>
+      <p:sp>
+        <p:nvSpPr>
+          <p:cNvPr id="2" name="Title 1"/>
+          <p:cNvSpPr>
+            <a:spLocks noGrp="1"/>
+          </p:cNvSpPr>
+          <p:nvPr>
+            <p:ph type="title"/>
+          </p:nvPr>
+        </p:nvSpPr>
+        <p:spPr>
+          <a:xfrm>
+            <a:off x="838200" y="0"/>
+            <a:ext cx="10515600" cy="1325563"/>
+          </a:xfrm>
+        </p:spPr>
+        <p:txBody>
+          <a:bodyPr/>
+          <a:lstStyle/>
+          <a:p>
+            <a:pPr algn="ctr"/>
+            <a:r>
+              <a:rPr lang="ru-RU" dirty="0" smtClean="0"/>
+              <a:t>Рекомендации по управлению конфликтами</a:t>
+            </a:r>
+            <a:endParaRPr lang="ru-RU" dirty="0"/>
+          </a:p>
+        </p:txBody>
+      </p:sp>
+      <p:sp>
+        <p:nvSpPr>
+          <p:cNvPr id="3" name="Content Placeholder 2"/>
+          <p:cNvSpPr>
+            <a:spLocks noGrp="1"/>
+          </p:cNvSpPr>
+          <p:nvPr>
+            <p:ph idx="1"/>
+          </p:nvPr>
+        </p:nvSpPr>
+        <p:spPr>
+          <a:xfrm>
+            <a:off x="838200" y="2009869"/>
+            <a:ext cx="10515600" cy="4848130"/>
+          </a:xfrm>
+        </p:spPr>
+        <p:txBody>
+          <a:bodyPr/>
+          <a:lstStyle/>
+          <a:p>
+            <a:pPr marL="514350" indent="-514350" algn="just">
+              <a:buFont typeface="+mj-lt"/>
+              <a:buAutoNum type="arabicPeriod"/>
+            </a:pPr>
+            <a:r>
+              <a:rPr lang="ru-RU" dirty="0" smtClean="0"/>
+              <a:t>Мониторинг, анкетирование.</a:t>
+            </a:r>
+          </a:p>
+          <a:p>
+            <a:pPr marL="514350" indent="-514350" algn="just">
+              <a:buFont typeface="+mj-lt"/>
+              <a:buAutoNum type="arabicPeriod"/>
+            </a:pPr>
+            <a:r>
+              <a:rPr lang="ru-RU" dirty="0" smtClean="0"/>
+              <a:t>Адаптация новых сотрудников.</a:t>
+            </a:r>
+          </a:p>
+          <a:p>
+            <a:pPr marL="514350" indent="-514350" algn="just">
+              <a:buFont typeface="+mj-lt"/>
+              <a:buAutoNum type="arabicPeriod"/>
+            </a:pPr>
+            <a:r>
+              <a:rPr lang="ru-RU" dirty="0" smtClean="0"/>
+              <a:t>Введение этикета.</a:t>
+            </a:r>
+          </a:p>
+          <a:p>
+            <a:pPr marL="514350" indent="-514350" algn="just">
+              <a:buFont typeface="+mj-lt"/>
+              <a:buAutoNum type="arabicPeriod"/>
+            </a:pPr>
+            <a:r>
+              <a:rPr lang="ru-RU" dirty="0" smtClean="0"/>
+              <a:t>Эффективное разрешение конфликтов.</a:t>
+            </a:r>
+          </a:p>
+          <a:p>
+            <a:pPr marL="514350" indent="-514350" algn="just">
+              <a:buFont typeface="+mj-lt"/>
+              <a:buAutoNum type="arabicPeriod"/>
+            </a:pPr>
+            <a:r>
+              <a:rPr lang="ru-RU" dirty="0" smtClean="0"/>
+              <a:t>Воздействие на сотрудников (справедливая оплата труда, тренинги).</a:t>
+            </a:r>
+          </a:p>
+          <a:p>
+            <a:pPr marL="514350" indent="-514350" algn="just">
+              <a:buFont typeface="+mj-lt"/>
+              <a:buAutoNum type="arabicPeriod"/>
+            </a:pPr>
+            <a:r>
+              <a:rPr lang="ru-RU" dirty="0" smtClean="0"/>
+              <a:t>Роль руководителя (разрешение конфликтов, передача опыта, мотивация).</a:t>
+            </a:r>
+          </a:p>
+          <a:p>
+            <a:pPr marL="514350" indent="-514350" algn="just">
+              <a:buFont typeface="+mj-lt"/>
+              <a:buAutoNum type="arabicPeriod"/>
+            </a:pPr>
+            <a:endParaRPr lang="ru-RU" dirty="0"/>
+          </a:p>
+        </p:txBody>
+      </p:sp>
+    </p:spTree>
+    <p:extLst>
+      <p:ext uri="{BB962C8B-B14F-4D97-AF65-F5344CB8AC3E}">
+        <p14:creationId xmlns:p14="http://schemas.microsoft.com/office/powerpoint/2010/main" val="3807888903"/>
       </p:ext>
     </p:extLst>
   </p:cSld>
@@ -3848,7 +3991,6 @@
               <a:rPr lang="ru-RU" dirty="0"/>
               <a:t>особый вид общения, в основе которого лежат противоречия в системе социально-трудовых отношений</a:t>
             </a:r>
-            <a:endParaRPr lang="ru-RU" dirty="0"/>
           </a:p>
         </p:txBody>
       </p:sp>
@@ -4380,11 +4522,7 @@
             <a:pPr algn="ctr"/>
             <a:r>
               <a:rPr lang="ru-RU" dirty="0" smtClean="0"/>
-              <a:t>Причины трудовы</a:t>
-            </a:r>
-            <a:r>
-              <a:rPr lang="ru-RU" dirty="0" smtClean="0"/>
-              <a:t>х конфликтов</a:t>
+              <a:t>Причины трудовых конфликтов</a:t>
             </a:r>
             <a:endParaRPr lang="ru-RU" dirty="0"/>
           </a:p>
@@ -4402,7 +4540,7 @@
         </p:nvSpPr>
         <p:spPr>
           <a:xfrm>
-            <a:off x="838200" y="1910281"/>
+            <a:off x="838200" y="1421394"/>
             <a:ext cx="10515600" cy="4947719"/>
           </a:xfrm>
         </p:spPr>
@@ -4456,13 +4594,38 @@
             <a:endParaRPr lang="ru-RU" dirty="0"/>
           </a:p>
           <a:p>
-            <a:pPr marL="0" indent="0" algn="just">
-              <a:buNone/>
+            <a:pPr marL="514350" indent="-514350" algn="just">
+              <a:buAutoNum type="arabicPeriod" startAt="3"/>
             </a:pPr>
             <a:r>
+              <a:rPr lang="ru-RU" dirty="0" smtClean="0"/>
+              <a:t>Административно-управленческие </a:t>
+            </a:r>
+            <a:r>
               <a:rPr lang="ru-RU" dirty="0"/>
-              <a:t>3.	Административно-управленческие (слабая коммуникация, отсутствие прозрачности).</a:t>
-            </a:r>
+              <a:t>(слабая коммуникация, отсутствие прозрачности</a:t>
+            </a:r>
+            <a:r>
+              <a:rPr lang="ru-RU" dirty="0" smtClean="0"/>
+              <a:t>).</a:t>
+            </a:r>
+            <a:endParaRPr lang="en-US" dirty="0" smtClean="0"/>
+          </a:p>
+          <a:p>
+            <a:pPr marL="514350" indent="-514350" algn="just">
+              <a:buAutoNum type="arabicPeriod" startAt="3"/>
+            </a:pPr>
+            <a:endParaRPr lang="en-US" dirty="0"/>
+          </a:p>
+          <a:p>
+            <a:pPr marL="514350" indent="-514350" algn="just">
+              <a:buAutoNum type="arabicPeriod" startAt="3"/>
+            </a:pPr>
+            <a:r>
+              <a:rPr lang="ru-RU" dirty="0"/>
+              <a:t>Личностные (различия в характерах, ценностях).</a:t>
+            </a:r>
+            <a:endParaRPr lang="ru-RU" dirty="0"/>
           </a:p>
           <a:p>
             <a:pPr marL="0" indent="0">
@@ -4685,6 +4848,841 @@
 </file>
 
 <file path=ppt/slides/slide5.xml><?xml version="1.0" encoding="utf-8"?>
+<p:sld xmlns:a="http://schemas.openxmlformats.org/drawingml/2006/main" xmlns:r="http://schemas.openxmlformats.org/officeDocument/2006/relationships" xmlns:p="http://schemas.openxmlformats.org/presentationml/2006/main">
+  <p:cSld>
+    <p:spTree>
+      <p:nvGrpSpPr>
+        <p:cNvPr id="1" name=""/>
+        <p:cNvGrpSpPr/>
+        <p:nvPr/>
+      </p:nvGrpSpPr>
+      <p:grpSpPr>
+        <a:xfrm>
+          <a:off x="0" y="0"/>
+          <a:ext cx="0" cy="0"/>
+          <a:chOff x="0" y="0"/>
+          <a:chExt cx="0" cy="0"/>
+        </a:xfrm>
+      </p:grpSpPr>
+      <p:sp>
+        <p:nvSpPr>
+          <p:cNvPr id="2" name="Title 1"/>
+          <p:cNvSpPr>
+            <a:spLocks noGrp="1"/>
+          </p:cNvSpPr>
+          <p:nvPr>
+            <p:ph type="title"/>
+          </p:nvPr>
+        </p:nvSpPr>
+        <p:spPr>
+          <a:xfrm>
+            <a:off x="838200" y="0"/>
+            <a:ext cx="10515600" cy="1325563"/>
+          </a:xfrm>
+        </p:spPr>
+        <p:txBody>
+          <a:bodyPr/>
+          <a:lstStyle/>
+          <a:p>
+            <a:pPr algn="ctr"/>
+            <a:r>
+              <a:rPr lang="ru-RU" dirty="0"/>
+              <a:t>Забастовка на заводе </a:t>
+            </a:r>
+            <a:r>
+              <a:rPr lang="ru-RU" dirty="0" err="1"/>
+              <a:t>Ford</a:t>
+            </a:r>
+            <a:r>
+              <a:rPr lang="ru-RU" dirty="0"/>
+              <a:t> </a:t>
+            </a:r>
+            <a:r>
+              <a:rPr lang="ru-RU" dirty="0" smtClean="0"/>
+              <a:t>1914 </a:t>
+            </a:r>
+            <a:r>
+              <a:rPr lang="ru-RU" dirty="0"/>
+              <a:t>г</a:t>
+            </a:r>
+            <a:r>
+              <a:rPr lang="ru-RU" dirty="0" smtClean="0"/>
+              <a:t>.</a:t>
+            </a:r>
+            <a:endParaRPr lang="ru-RU" dirty="0"/>
+          </a:p>
+        </p:txBody>
+      </p:sp>
+      <p:sp>
+        <p:nvSpPr>
+          <p:cNvPr id="3" name="Content Placeholder 2"/>
+          <p:cNvSpPr>
+            <a:spLocks noGrp="1"/>
+          </p:cNvSpPr>
+          <p:nvPr>
+            <p:ph idx="1"/>
+          </p:nvPr>
+        </p:nvSpPr>
+        <p:spPr>
+          <a:xfrm>
+            <a:off x="838199" y="1638677"/>
+            <a:ext cx="6696075" cy="4572000"/>
+          </a:xfrm>
+        </p:spPr>
+        <p:txBody>
+          <a:bodyPr>
+            <a:normAutofit/>
+          </a:bodyPr>
+          <a:lstStyle/>
+          <a:p>
+            <a:r>
+              <a:rPr lang="ru-RU" dirty="0" smtClean="0"/>
+              <a:t>Причина: социально-экономическая</a:t>
+            </a:r>
+          </a:p>
+          <a:p>
+            <a:endParaRPr lang="ru-RU" dirty="0" smtClean="0"/>
+          </a:p>
+          <a:p>
+            <a:r>
+              <a:rPr lang="ru-RU" dirty="0" smtClean="0"/>
+              <a:t>Функции конфликта: сигнальная, инновационная</a:t>
+            </a:r>
+          </a:p>
+          <a:p>
+            <a:endParaRPr lang="ru-RU" dirty="0" smtClean="0"/>
+          </a:p>
+          <a:p>
+            <a:r>
+              <a:rPr lang="ru-RU" dirty="0" smtClean="0"/>
+              <a:t>Решение: мотивация труда</a:t>
+            </a:r>
+          </a:p>
+          <a:p>
+            <a:endParaRPr lang="ru-RU" dirty="0" smtClean="0"/>
+          </a:p>
+          <a:p>
+            <a:r>
+              <a:rPr lang="ru-RU" dirty="0" smtClean="0"/>
+              <a:t>Последствия: снижение текучести кадров</a:t>
+            </a:r>
+            <a:endParaRPr lang="ru-RU" dirty="0"/>
+          </a:p>
+        </p:txBody>
+      </p:sp>
+      <p:pic>
+        <p:nvPicPr>
+          <p:cNvPr id="1026" name="Picture 2" descr="undefined"/>
+          <p:cNvPicPr>
+            <a:picLocks noChangeAspect="1" noChangeArrowheads="1"/>
+          </p:cNvPicPr>
+          <p:nvPr/>
+        </p:nvPicPr>
+        <p:blipFill>
+          <a:blip r:embed="rId2">
+            <a:extLst>
+              <a:ext uri="{28A0092B-C50C-407E-A947-70E740481C1C}">
+                <a14:useLocalDpi xmlns:a14="http://schemas.microsoft.com/office/drawing/2010/main" val="0"/>
+              </a:ext>
+            </a:extLst>
+          </a:blip>
+          <a:srcRect/>
+          <a:stretch>
+            <a:fillRect/>
+          </a:stretch>
+        </p:blipFill>
+        <p:spPr bwMode="auto">
+          <a:xfrm>
+            <a:off x="7116025" y="2209015"/>
+            <a:ext cx="4237776" cy="3307791"/>
+          </a:xfrm>
+          <a:prstGeom prst="rect">
+            <a:avLst/>
+          </a:prstGeom>
+          <a:noFill/>
+          <a:extLst>
+            <a:ext uri="{909E8E84-426E-40DD-AFC4-6F175D3DCCD1}">
+              <a14:hiddenFill xmlns:a14="http://schemas.microsoft.com/office/drawing/2010/main">
+                <a:solidFill>
+                  <a:srgbClr val="FFFFFF"/>
+                </a:solidFill>
+              </a14:hiddenFill>
+            </a:ext>
+          </a:extLst>
+        </p:spPr>
+      </p:pic>
+    </p:spTree>
+    <p:extLst>
+      <p:ext uri="{BB962C8B-B14F-4D97-AF65-F5344CB8AC3E}">
+        <p14:creationId xmlns:p14="http://schemas.microsoft.com/office/powerpoint/2010/main" val="492250471"/>
+      </p:ext>
+    </p:extLst>
+  </p:cSld>
+  <p:clrMapOvr>
+    <a:masterClrMapping/>
+  </p:clrMapOvr>
+  <p:timing>
+    <p:tnLst>
+      <p:par>
+        <p:cTn id="1" dur="indefinite" restart="never" nodeType="tmRoot"/>
+      </p:par>
+    </p:tnLst>
+  </p:timing>
+</p:sld>
+</file>
+
+<file path=ppt/slides/slide6.xml><?xml version="1.0" encoding="utf-8"?>
+<p:sld xmlns:a="http://schemas.openxmlformats.org/drawingml/2006/main" xmlns:r="http://schemas.openxmlformats.org/officeDocument/2006/relationships" xmlns:p="http://schemas.openxmlformats.org/presentationml/2006/main">
+  <p:cSld>
+    <p:spTree>
+      <p:nvGrpSpPr>
+        <p:cNvPr id="1" name=""/>
+        <p:cNvGrpSpPr/>
+        <p:nvPr/>
+      </p:nvGrpSpPr>
+      <p:grpSpPr>
+        <a:xfrm>
+          <a:off x="0" y="0"/>
+          <a:ext cx="0" cy="0"/>
+          <a:chOff x="0" y="0"/>
+          <a:chExt cx="0" cy="0"/>
+        </a:xfrm>
+      </p:grpSpPr>
+      <p:sp>
+        <p:nvSpPr>
+          <p:cNvPr id="2" name="Title 1"/>
+          <p:cNvSpPr>
+            <a:spLocks noGrp="1"/>
+          </p:cNvSpPr>
+          <p:nvPr>
+            <p:ph type="title"/>
+          </p:nvPr>
+        </p:nvSpPr>
+        <p:spPr>
+          <a:xfrm>
+            <a:off x="838200" y="0"/>
+            <a:ext cx="10515600" cy="1325563"/>
+          </a:xfrm>
+        </p:spPr>
+        <p:txBody>
+          <a:bodyPr/>
+          <a:lstStyle/>
+          <a:p>
+            <a:pPr algn="ctr"/>
+            <a:r>
+              <a:rPr lang="ru-RU" dirty="0"/>
+              <a:t>Пожар на фабрике </a:t>
+            </a:r>
+            <a:r>
+              <a:rPr lang="en-US" dirty="0"/>
+              <a:t>Triangle Shirtwaist </a:t>
+            </a:r>
+            <a:r>
+              <a:rPr lang="en-US" dirty="0" smtClean="0"/>
+              <a:t>1911 </a:t>
+            </a:r>
+            <a:r>
+              <a:rPr lang="ru-RU" dirty="0"/>
+              <a:t>г</a:t>
+            </a:r>
+            <a:r>
+              <a:rPr lang="ru-RU" dirty="0" smtClean="0"/>
+              <a:t>.</a:t>
+            </a:r>
+            <a:endParaRPr lang="ru-RU" dirty="0"/>
+          </a:p>
+        </p:txBody>
+      </p:sp>
+      <p:pic>
+        <p:nvPicPr>
+          <p:cNvPr id="2050" name="Picture 2" descr="Пожар на фабрике «Трайангл»"/>
+          <p:cNvPicPr>
+            <a:picLocks noGrp="1" noChangeAspect="1" noChangeArrowheads="1"/>
+          </p:cNvPicPr>
+          <p:nvPr>
+            <p:ph idx="1"/>
+          </p:nvPr>
+        </p:nvPicPr>
+        <p:blipFill>
+          <a:blip r:embed="rId2">
+            <a:extLst>
+              <a:ext uri="{28A0092B-C50C-407E-A947-70E740481C1C}">
+                <a14:useLocalDpi xmlns:a14="http://schemas.microsoft.com/office/drawing/2010/main" val="0"/>
+              </a:ext>
+            </a:extLst>
+          </a:blip>
+          <a:srcRect/>
+          <a:stretch>
+            <a:fillRect/>
+          </a:stretch>
+        </p:blipFill>
+        <p:spPr bwMode="auto">
+          <a:xfrm>
+            <a:off x="7958751" y="1630866"/>
+            <a:ext cx="3395049" cy="4446257"/>
+          </a:xfrm>
+          <a:prstGeom prst="rect">
+            <a:avLst/>
+          </a:prstGeom>
+          <a:noFill/>
+          <a:extLst>
+            <a:ext uri="{909E8E84-426E-40DD-AFC4-6F175D3DCCD1}">
+              <a14:hiddenFill xmlns:a14="http://schemas.microsoft.com/office/drawing/2010/main">
+                <a:solidFill>
+                  <a:srgbClr val="FFFFFF"/>
+                </a:solidFill>
+              </a14:hiddenFill>
+            </a:ext>
+          </a:extLst>
+        </p:spPr>
+      </p:pic>
+      <p:sp>
+        <p:nvSpPr>
+          <p:cNvPr id="4" name="Rectangle 3"/>
+          <p:cNvSpPr/>
+          <p:nvPr/>
+        </p:nvSpPr>
+        <p:spPr>
+          <a:xfrm>
+            <a:off x="838199" y="1675918"/>
+            <a:ext cx="7120552" cy="4401205"/>
+          </a:xfrm>
+          <a:prstGeom prst="rect">
+            <a:avLst/>
+          </a:prstGeom>
+        </p:spPr>
+        <p:txBody>
+          <a:bodyPr wrap="square">
+            <a:spAutoFit/>
+          </a:bodyPr>
+          <a:lstStyle/>
+          <a:p>
+            <a:pPr marL="457200" indent="-457200">
+              <a:buFont typeface="Arial" panose="020B0604020202020204" pitchFamily="34" charset="0"/>
+              <a:buChar char="•"/>
+            </a:pPr>
+            <a:r>
+              <a:rPr lang="ru-RU" sz="2800" dirty="0"/>
+              <a:t>Причина: </a:t>
+            </a:r>
+            <a:r>
+              <a:rPr lang="ru-RU" sz="2800" dirty="0" smtClean="0"/>
+              <a:t>организационно-технологическая</a:t>
+            </a:r>
+          </a:p>
+          <a:p>
+            <a:endParaRPr lang="ru-RU" sz="2800" dirty="0" smtClean="0"/>
+          </a:p>
+          <a:p>
+            <a:pPr marL="457200" indent="-457200">
+              <a:buFont typeface="Arial" panose="020B0604020202020204" pitchFamily="34" charset="0"/>
+              <a:buChar char="•"/>
+            </a:pPr>
+            <a:r>
+              <a:rPr lang="ru-RU" sz="2800" dirty="0" smtClean="0"/>
+              <a:t>Функции </a:t>
+            </a:r>
+            <a:r>
+              <a:rPr lang="ru-RU" sz="2800" dirty="0"/>
+              <a:t>конфликта: </a:t>
+            </a:r>
+            <a:r>
+              <a:rPr lang="ru-RU" sz="2800" dirty="0" smtClean="0"/>
+              <a:t>интегративная, </a:t>
+            </a:r>
+            <a:r>
+              <a:rPr lang="ru-RU" sz="2800" dirty="0"/>
+              <a:t>инновационная</a:t>
+            </a:r>
+          </a:p>
+          <a:p>
+            <a:endParaRPr lang="ru-RU" sz="2800" dirty="0"/>
+          </a:p>
+          <a:p>
+            <a:pPr marL="457200" indent="-457200">
+              <a:buFont typeface="Arial" panose="020B0604020202020204" pitchFamily="34" charset="0"/>
+              <a:buChar char="•"/>
+            </a:pPr>
+            <a:r>
+              <a:rPr lang="ru-RU" sz="2800" dirty="0"/>
+              <a:t>Решение: </a:t>
+            </a:r>
+            <a:r>
+              <a:rPr lang="ru-RU" sz="2800" dirty="0" smtClean="0"/>
+              <a:t>кодекс этики, закон о пожарной безопасности</a:t>
+            </a:r>
+            <a:endParaRPr lang="ru-RU" sz="2800" dirty="0"/>
+          </a:p>
+          <a:p>
+            <a:endParaRPr lang="ru-RU" sz="2800" dirty="0"/>
+          </a:p>
+          <a:p>
+            <a:pPr marL="457200" indent="-457200">
+              <a:buFont typeface="Arial" panose="020B0604020202020204" pitchFamily="34" charset="0"/>
+              <a:buChar char="•"/>
+            </a:pPr>
+            <a:r>
+              <a:rPr lang="ru-RU" sz="2800" dirty="0"/>
+              <a:t>Последствия: </a:t>
+            </a:r>
+            <a:r>
+              <a:rPr lang="ru-RU" sz="2800" dirty="0" smtClean="0"/>
+              <a:t>трудовые стандарты в США</a:t>
+            </a:r>
+            <a:endParaRPr lang="ru-RU" sz="2800" dirty="0"/>
+          </a:p>
+        </p:txBody>
+      </p:sp>
+    </p:spTree>
+    <p:extLst>
+      <p:ext uri="{BB962C8B-B14F-4D97-AF65-F5344CB8AC3E}">
+        <p14:creationId xmlns:p14="http://schemas.microsoft.com/office/powerpoint/2010/main" val="366179613"/>
+      </p:ext>
+    </p:extLst>
+  </p:cSld>
+  <p:clrMapOvr>
+    <a:masterClrMapping/>
+  </p:clrMapOvr>
+  <p:timing>
+    <p:tnLst>
+      <p:par>
+        <p:cTn id="1" dur="indefinite" restart="never" nodeType="tmRoot"/>
+      </p:par>
+    </p:tnLst>
+  </p:timing>
+</p:sld>
+</file>
+
+<file path=ppt/slides/slide7.xml><?xml version="1.0" encoding="utf-8"?>
+<p:sld xmlns:a="http://schemas.openxmlformats.org/drawingml/2006/main" xmlns:r="http://schemas.openxmlformats.org/officeDocument/2006/relationships" xmlns:p="http://schemas.openxmlformats.org/presentationml/2006/main">
+  <p:cSld>
+    <p:spTree>
+      <p:nvGrpSpPr>
+        <p:cNvPr id="1" name=""/>
+        <p:cNvGrpSpPr/>
+        <p:nvPr/>
+      </p:nvGrpSpPr>
+      <p:grpSpPr>
+        <a:xfrm>
+          <a:off x="0" y="0"/>
+          <a:ext cx="0" cy="0"/>
+          <a:chOff x="0" y="0"/>
+          <a:chExt cx="0" cy="0"/>
+        </a:xfrm>
+      </p:grpSpPr>
+      <p:sp>
+        <p:nvSpPr>
+          <p:cNvPr id="2" name="Title 1"/>
+          <p:cNvSpPr>
+            <a:spLocks noGrp="1"/>
+          </p:cNvSpPr>
+          <p:nvPr>
+            <p:ph type="title"/>
+          </p:nvPr>
+        </p:nvSpPr>
+        <p:spPr>
+          <a:xfrm>
+            <a:off x="838200" y="0"/>
+            <a:ext cx="10515600" cy="1325563"/>
+          </a:xfrm>
+        </p:spPr>
+        <p:txBody>
+          <a:bodyPr/>
+          <a:lstStyle/>
+          <a:p>
+            <a:pPr algn="ctr"/>
+            <a:r>
+              <a:rPr lang="ru-RU" dirty="0"/>
+              <a:t>Конфликт на заводе </a:t>
+            </a:r>
+            <a:r>
+              <a:rPr lang="ru-RU" dirty="0" err="1" smtClean="0"/>
+              <a:t>Toyota</a:t>
+            </a:r>
+            <a:r>
+              <a:rPr lang="ru-RU" dirty="0" smtClean="0"/>
+              <a:t> 1950 г.</a:t>
+            </a:r>
+            <a:endParaRPr lang="ru-RU" dirty="0"/>
+          </a:p>
+        </p:txBody>
+      </p:sp>
+      <p:sp>
+        <p:nvSpPr>
+          <p:cNvPr id="4" name="Rectangle 3"/>
+          <p:cNvSpPr/>
+          <p:nvPr/>
+        </p:nvSpPr>
+        <p:spPr>
+          <a:xfrm>
+            <a:off x="838200" y="1595021"/>
+            <a:ext cx="5975842" cy="4832092"/>
+          </a:xfrm>
+          <a:prstGeom prst="rect">
+            <a:avLst/>
+          </a:prstGeom>
+        </p:spPr>
+        <p:txBody>
+          <a:bodyPr wrap="square">
+            <a:spAutoFit/>
+          </a:bodyPr>
+          <a:lstStyle/>
+          <a:p>
+            <a:pPr marL="457200" indent="-457200">
+              <a:buFont typeface="Arial" panose="020B0604020202020204" pitchFamily="34" charset="0"/>
+              <a:buChar char="•"/>
+            </a:pPr>
+            <a:r>
+              <a:rPr lang="ru-RU" sz="2800" dirty="0"/>
+              <a:t>Причина: </a:t>
+            </a:r>
+            <a:r>
+              <a:rPr lang="ru-RU" sz="2800" dirty="0" smtClean="0"/>
+              <a:t>административно-управленческая</a:t>
+            </a:r>
+          </a:p>
+          <a:p>
+            <a:pPr marL="457200" indent="-457200">
+              <a:buFont typeface="Arial" panose="020B0604020202020204" pitchFamily="34" charset="0"/>
+              <a:buChar char="•"/>
+            </a:pPr>
+            <a:endParaRPr lang="ru-RU" sz="2800" dirty="0" smtClean="0"/>
+          </a:p>
+          <a:p>
+            <a:pPr marL="457200" indent="-457200">
+              <a:buFont typeface="Arial" panose="020B0604020202020204" pitchFamily="34" charset="0"/>
+              <a:buChar char="•"/>
+            </a:pPr>
+            <a:r>
+              <a:rPr lang="ru-RU" sz="2800" dirty="0" smtClean="0"/>
+              <a:t>Функции </a:t>
+            </a:r>
+            <a:r>
+              <a:rPr lang="ru-RU" sz="2800" dirty="0"/>
+              <a:t>конфликта: </a:t>
+            </a:r>
+            <a:r>
+              <a:rPr lang="ru-RU" sz="2800" dirty="0" smtClean="0"/>
+              <a:t>социализирующая, сигнальная</a:t>
+            </a:r>
+          </a:p>
+          <a:p>
+            <a:pPr marL="457200" indent="-457200">
+              <a:buFont typeface="Arial" panose="020B0604020202020204" pitchFamily="34" charset="0"/>
+              <a:buChar char="•"/>
+            </a:pPr>
+            <a:endParaRPr lang="ru-RU" sz="2800" dirty="0"/>
+          </a:p>
+          <a:p>
+            <a:pPr marL="457200" indent="-457200">
+              <a:buFont typeface="Arial" panose="020B0604020202020204" pitchFamily="34" charset="0"/>
+              <a:buChar char="•"/>
+            </a:pPr>
+            <a:r>
+              <a:rPr lang="ru-RU" sz="2800" dirty="0"/>
+              <a:t>Решение: </a:t>
+            </a:r>
+            <a:r>
+              <a:rPr lang="ru-RU" sz="2800" dirty="0" smtClean="0"/>
+              <a:t>Производственная система </a:t>
+            </a:r>
+            <a:r>
+              <a:rPr lang="ru-RU" sz="2800" dirty="0"/>
+              <a:t>«Тойота</a:t>
+            </a:r>
+            <a:r>
+              <a:rPr lang="ru-RU" sz="2800" dirty="0" smtClean="0"/>
+              <a:t>»</a:t>
+            </a:r>
+          </a:p>
+          <a:p>
+            <a:pPr marL="457200" indent="-457200">
+              <a:buFont typeface="Arial" panose="020B0604020202020204" pitchFamily="34" charset="0"/>
+              <a:buChar char="•"/>
+            </a:pPr>
+            <a:endParaRPr lang="ru-RU" sz="2800" dirty="0"/>
+          </a:p>
+          <a:p>
+            <a:pPr marL="457200" indent="-457200">
+              <a:buFont typeface="Arial" panose="020B0604020202020204" pitchFamily="34" charset="0"/>
+              <a:buChar char="•"/>
+            </a:pPr>
+            <a:r>
+              <a:rPr lang="ru-RU" sz="2800" dirty="0"/>
+              <a:t>Последствия: </a:t>
+            </a:r>
+            <a:r>
+              <a:rPr lang="ru-RU" sz="2800" dirty="0" smtClean="0"/>
+              <a:t>мировое лидерство в </a:t>
+            </a:r>
+            <a:r>
+              <a:rPr lang="ru-RU" sz="2800" dirty="0"/>
+              <a:t>эффективном управлении</a:t>
+            </a:r>
+            <a:endParaRPr lang="ru-RU" sz="2800" dirty="0"/>
+          </a:p>
+        </p:txBody>
+      </p:sp>
+      <p:pic>
+        <p:nvPicPr>
+          <p:cNvPr id="6" name="Picture 5"/>
+          <p:cNvPicPr>
+            <a:picLocks noChangeAspect="1"/>
+          </p:cNvPicPr>
+          <p:nvPr/>
+        </p:nvPicPr>
+        <p:blipFill>
+          <a:blip r:embed="rId2"/>
+          <a:stretch>
+            <a:fillRect/>
+          </a:stretch>
+        </p:blipFill>
+        <p:spPr>
+          <a:xfrm>
+            <a:off x="6814042" y="2674360"/>
+            <a:ext cx="4539758" cy="2673413"/>
+          </a:xfrm>
+          <a:prstGeom prst="rect">
+            <a:avLst/>
+          </a:prstGeom>
+        </p:spPr>
+      </p:pic>
+    </p:spTree>
+    <p:extLst>
+      <p:ext uri="{BB962C8B-B14F-4D97-AF65-F5344CB8AC3E}">
+        <p14:creationId xmlns:p14="http://schemas.microsoft.com/office/powerpoint/2010/main" val="604086321"/>
+      </p:ext>
+    </p:extLst>
+  </p:cSld>
+  <p:clrMapOvr>
+    <a:masterClrMapping/>
+  </p:clrMapOvr>
+  <p:timing>
+    <p:tnLst>
+      <p:par>
+        <p:cTn id="1" dur="indefinite" restart="never" nodeType="tmRoot"/>
+      </p:par>
+    </p:tnLst>
+  </p:timing>
+</p:sld>
+</file>
+
+<file path=ppt/slides/slide8.xml><?xml version="1.0" encoding="utf-8"?>
+<p:sld xmlns:a="http://schemas.openxmlformats.org/drawingml/2006/main" xmlns:r="http://schemas.openxmlformats.org/officeDocument/2006/relationships" xmlns:p="http://schemas.openxmlformats.org/presentationml/2006/main">
+  <p:cSld>
+    <p:spTree>
+      <p:nvGrpSpPr>
+        <p:cNvPr id="1" name=""/>
+        <p:cNvGrpSpPr/>
+        <p:nvPr/>
+      </p:nvGrpSpPr>
+      <p:grpSpPr>
+        <a:xfrm>
+          <a:off x="0" y="0"/>
+          <a:ext cx="0" cy="0"/>
+          <a:chOff x="0" y="0"/>
+          <a:chExt cx="0" cy="0"/>
+        </a:xfrm>
+      </p:grpSpPr>
+      <p:sp>
+        <p:nvSpPr>
+          <p:cNvPr id="2" name="Title 1"/>
+          <p:cNvSpPr>
+            <a:spLocks noGrp="1"/>
+          </p:cNvSpPr>
+          <p:nvPr>
+            <p:ph type="title"/>
+          </p:nvPr>
+        </p:nvSpPr>
+        <p:spPr>
+          <a:xfrm>
+            <a:off x="838200" y="0"/>
+            <a:ext cx="10515600" cy="1325563"/>
+          </a:xfrm>
+        </p:spPr>
+        <p:txBody>
+          <a:bodyPr/>
+          <a:lstStyle/>
+          <a:p>
+            <a:pPr algn="ctr"/>
+            <a:r>
+              <a:rPr lang="ru-RU" dirty="0"/>
+              <a:t>Конфликт в </a:t>
+            </a:r>
+            <a:r>
+              <a:rPr lang="ru-RU" dirty="0" err="1"/>
+              <a:t>Amazon</a:t>
+            </a:r>
+            <a:r>
+              <a:rPr lang="ru-RU" dirty="0"/>
+              <a:t> </a:t>
+            </a:r>
+            <a:r>
+              <a:rPr lang="ru-RU" dirty="0" smtClean="0"/>
+              <a:t>2020–2023 </a:t>
+            </a:r>
+            <a:r>
+              <a:rPr lang="ru-RU" dirty="0"/>
+              <a:t>гг</a:t>
+            </a:r>
+            <a:r>
+              <a:rPr lang="ru-RU" dirty="0" smtClean="0"/>
+              <a:t>.</a:t>
+            </a:r>
+            <a:endParaRPr lang="ru-RU" dirty="0"/>
+          </a:p>
+        </p:txBody>
+      </p:sp>
+      <p:sp>
+        <p:nvSpPr>
+          <p:cNvPr id="4" name="Rectangle 3"/>
+          <p:cNvSpPr/>
+          <p:nvPr/>
+        </p:nvSpPr>
+        <p:spPr>
+          <a:xfrm>
+            <a:off x="838200" y="1325563"/>
+            <a:ext cx="5975842" cy="5262979"/>
+          </a:xfrm>
+          <a:prstGeom prst="rect">
+            <a:avLst/>
+          </a:prstGeom>
+        </p:spPr>
+        <p:txBody>
+          <a:bodyPr wrap="square">
+            <a:spAutoFit/>
+          </a:bodyPr>
+          <a:lstStyle/>
+          <a:p>
+            <a:pPr marL="457200" indent="-457200">
+              <a:buFont typeface="Arial" panose="020B0604020202020204" pitchFamily="34" charset="0"/>
+              <a:buChar char="•"/>
+            </a:pPr>
+            <a:r>
+              <a:rPr lang="ru-RU" sz="2800" dirty="0"/>
+              <a:t>Причина: </a:t>
+            </a:r>
+            <a:r>
+              <a:rPr lang="ru-RU" sz="2800" dirty="0" smtClean="0"/>
+              <a:t>личностная, административная</a:t>
+            </a:r>
+          </a:p>
+          <a:p>
+            <a:endParaRPr lang="ru-RU" sz="2800" dirty="0" smtClean="0"/>
+          </a:p>
+          <a:p>
+            <a:pPr marL="457200" indent="-457200">
+              <a:buFont typeface="Arial" panose="020B0604020202020204" pitchFamily="34" charset="0"/>
+              <a:buChar char="•"/>
+            </a:pPr>
+            <a:r>
+              <a:rPr lang="ru-RU" sz="2800" dirty="0" smtClean="0"/>
+              <a:t>Функции </a:t>
+            </a:r>
+            <a:r>
+              <a:rPr lang="ru-RU" sz="2800" dirty="0"/>
+              <a:t>конфликта: </a:t>
+            </a:r>
+            <a:r>
+              <a:rPr lang="ru-RU" sz="2800" dirty="0" smtClean="0"/>
+              <a:t>инновационная, социально-психологическа</a:t>
+            </a:r>
+            <a:r>
+              <a:rPr lang="ru-RU" sz="2800" dirty="0"/>
+              <a:t>я</a:t>
+            </a:r>
+            <a:endParaRPr lang="ru-RU" sz="2800" dirty="0" smtClean="0"/>
+          </a:p>
+          <a:p>
+            <a:pPr marL="457200" indent="-457200">
+              <a:buFont typeface="Arial" panose="020B0604020202020204" pitchFamily="34" charset="0"/>
+              <a:buChar char="•"/>
+            </a:pPr>
+            <a:endParaRPr lang="ru-RU" sz="2800" dirty="0"/>
+          </a:p>
+          <a:p>
+            <a:pPr marL="457200" indent="-457200">
+              <a:buFont typeface="Arial" panose="020B0604020202020204" pitchFamily="34" charset="0"/>
+              <a:buChar char="•"/>
+            </a:pPr>
+            <a:r>
+              <a:rPr lang="ru-RU" sz="2800" dirty="0"/>
+              <a:t>Решение: </a:t>
+            </a:r>
+            <a:r>
+              <a:rPr lang="ru-RU" sz="2800" dirty="0" smtClean="0"/>
+              <a:t>тренинги, мотивация труда, разрешение профсоюзов</a:t>
+            </a:r>
+          </a:p>
+          <a:p>
+            <a:pPr marL="457200" indent="-457200">
+              <a:buFont typeface="Arial" panose="020B0604020202020204" pitchFamily="34" charset="0"/>
+              <a:buChar char="•"/>
+            </a:pPr>
+            <a:endParaRPr lang="ru-RU" sz="2800" dirty="0"/>
+          </a:p>
+          <a:p>
+            <a:pPr marL="457200" indent="-457200">
+              <a:buFont typeface="Arial" panose="020B0604020202020204" pitchFamily="34" charset="0"/>
+              <a:buChar char="•"/>
+            </a:pPr>
+            <a:r>
+              <a:rPr lang="ru-RU" sz="2800" dirty="0"/>
+              <a:t>Последствия: </a:t>
+            </a:r>
+            <a:r>
+              <a:rPr lang="ru-RU" sz="2800" dirty="0" smtClean="0"/>
+              <a:t>рост количества профсоюзов</a:t>
+            </a:r>
+            <a:endParaRPr lang="ru-RU" sz="2800" dirty="0"/>
+          </a:p>
+        </p:txBody>
+      </p:sp>
+      <p:pic>
+        <p:nvPicPr>
+          <p:cNvPr id="5" name="Picture 4"/>
+          <p:cNvPicPr>
+            <a:picLocks noChangeAspect="1"/>
+          </p:cNvPicPr>
+          <p:nvPr/>
+        </p:nvPicPr>
+        <p:blipFill>
+          <a:blip r:embed="rId2"/>
+          <a:stretch>
+            <a:fillRect/>
+          </a:stretch>
+        </p:blipFill>
+        <p:spPr>
+          <a:xfrm>
+            <a:off x="6430108" y="2356852"/>
+            <a:ext cx="4923692" cy="3200400"/>
+          </a:xfrm>
+          <a:prstGeom prst="rect">
+            <a:avLst/>
+          </a:prstGeom>
+        </p:spPr>
+      </p:pic>
+    </p:spTree>
+    <p:extLst>
+      <p:ext uri="{BB962C8B-B14F-4D97-AF65-F5344CB8AC3E}">
+        <p14:creationId xmlns:p14="http://schemas.microsoft.com/office/powerpoint/2010/main" val="4104661636"/>
+      </p:ext>
+    </p:extLst>
+  </p:cSld>
+  <p:clrMapOvr>
+    <a:masterClrMapping/>
+  </p:clrMapOvr>
+  <p:timing>
+    <p:tnLst>
+      <p:par>
+        <p:cTn id="1" dur="indefinite" restart="never" nodeType="tmRoot"/>
+      </p:par>
+    </p:tnLst>
+  </p:timing>
+</p:sld>
+</file>
+
+<file path=ppt/slides/slide9.xml><?xml version="1.0" encoding="utf-8"?>
 <p:sld xmlns:a="http://schemas.openxmlformats.org/drawingml/2006/main" xmlns:r="http://schemas.openxmlformats.org/officeDocument/2006/relationships" xmlns:p="http://schemas.openxmlformats.org/presentationml/2006/main">
   <p:cSld>
     <p:spTree>
@@ -5007,160 +6005,6 @@
     <p:extLst>
       <p:ext uri="{BB962C8B-B14F-4D97-AF65-F5344CB8AC3E}">
         <p14:creationId xmlns:p14="http://schemas.microsoft.com/office/powerpoint/2010/main" val="3488876949"/>
-      </p:ext>
-    </p:extLst>
-  </p:cSld>
-  <p:clrMapOvr>
-    <a:masterClrMapping/>
-  </p:clrMapOvr>
-  <p:timing>
-    <p:tnLst>
-      <p:par>
-        <p:cTn id="1" dur="indefinite" restart="never" nodeType="tmRoot"/>
-      </p:par>
-    </p:tnLst>
-  </p:timing>
-</p:sld>
-</file>
-
-<file path=ppt/slides/slide6.xml><?xml version="1.0" encoding="utf-8"?>
-<p:sld xmlns:a="http://schemas.openxmlformats.org/drawingml/2006/main" xmlns:r="http://schemas.openxmlformats.org/officeDocument/2006/relationships" xmlns:p="http://schemas.openxmlformats.org/presentationml/2006/main">
-  <p:cSld>
-    <p:spTree>
-      <p:nvGrpSpPr>
-        <p:cNvPr id="1" name=""/>
-        <p:cNvGrpSpPr/>
-        <p:nvPr/>
-      </p:nvGrpSpPr>
-      <p:grpSpPr>
-        <a:xfrm>
-          <a:off x="0" y="0"/>
-          <a:ext cx="0" cy="0"/>
-          <a:chOff x="0" y="0"/>
-          <a:chExt cx="0" cy="0"/>
-        </a:xfrm>
-      </p:grpSpPr>
-      <p:sp>
-        <p:nvSpPr>
-          <p:cNvPr id="2" name="Title 1"/>
-          <p:cNvSpPr>
-            <a:spLocks noGrp="1"/>
-          </p:cNvSpPr>
-          <p:nvPr>
-            <p:ph type="title"/>
-          </p:nvPr>
-        </p:nvSpPr>
-        <p:spPr>
-          <a:xfrm>
-            <a:off x="838200" y="0"/>
-            <a:ext cx="10515600" cy="1325563"/>
-          </a:xfrm>
-        </p:spPr>
-        <p:txBody>
-          <a:bodyPr/>
-          <a:lstStyle/>
-          <a:p>
-            <a:pPr algn="ctr"/>
-            <a:r>
-              <a:rPr lang="ru-RU" dirty="0" smtClean="0"/>
-              <a:t>Рекомендации по управлению конфликтами</a:t>
-            </a:r>
-            <a:endParaRPr lang="ru-RU" dirty="0"/>
-          </a:p>
-        </p:txBody>
-      </p:sp>
-      <p:sp>
-        <p:nvSpPr>
-          <p:cNvPr id="3" name="Content Placeholder 2"/>
-          <p:cNvSpPr>
-            <a:spLocks noGrp="1"/>
-          </p:cNvSpPr>
-          <p:nvPr>
-            <p:ph idx="1"/>
-          </p:nvPr>
-        </p:nvSpPr>
-        <p:spPr>
-          <a:xfrm>
-            <a:off x="838200" y="2009869"/>
-            <a:ext cx="10515600" cy="4848130"/>
-          </a:xfrm>
-        </p:spPr>
-        <p:txBody>
-          <a:bodyPr/>
-          <a:lstStyle/>
-          <a:p>
-            <a:pPr marL="514350" indent="-514350" algn="just">
-              <a:buFont typeface="+mj-lt"/>
-              <a:buAutoNum type="arabicPeriod"/>
-            </a:pPr>
-            <a:r>
-              <a:rPr lang="ru-RU" dirty="0" smtClean="0"/>
-              <a:t>Мониторинг, анкетирование.</a:t>
-            </a:r>
-          </a:p>
-          <a:p>
-            <a:pPr marL="514350" indent="-514350" algn="just">
-              <a:buFont typeface="+mj-lt"/>
-              <a:buAutoNum type="arabicPeriod"/>
-            </a:pPr>
-            <a:r>
-              <a:rPr lang="ru-RU" dirty="0" smtClean="0"/>
-              <a:t>Адаптация новых сотрудников.</a:t>
-            </a:r>
-          </a:p>
-          <a:p>
-            <a:pPr marL="514350" indent="-514350" algn="just">
-              <a:buFont typeface="+mj-lt"/>
-              <a:buAutoNum type="arabicPeriod"/>
-            </a:pPr>
-            <a:r>
-              <a:rPr lang="ru-RU" dirty="0" smtClean="0"/>
-              <a:t>Введение этикета.</a:t>
-            </a:r>
-          </a:p>
-          <a:p>
-            <a:pPr marL="514350" indent="-514350" algn="just">
-              <a:buFont typeface="+mj-lt"/>
-              <a:buAutoNum type="arabicPeriod"/>
-            </a:pPr>
-            <a:r>
-              <a:rPr lang="ru-RU" dirty="0" smtClean="0"/>
-              <a:t>Эффективное разрешение конфликтов.</a:t>
-            </a:r>
-          </a:p>
-          <a:p>
-            <a:pPr marL="514350" indent="-514350" algn="just">
-              <a:buFont typeface="+mj-lt"/>
-              <a:buAutoNum type="arabicPeriod"/>
-            </a:pPr>
-            <a:r>
-              <a:rPr lang="ru-RU" dirty="0" smtClean="0"/>
-              <a:t>Воздействие на сотрудников (справедливая оплата труда, тренинги).</a:t>
-            </a:r>
-          </a:p>
-          <a:p>
-            <a:pPr marL="514350" indent="-514350" algn="just">
-              <a:buFont typeface="+mj-lt"/>
-              <a:buAutoNum type="arabicPeriod"/>
-            </a:pPr>
-            <a:r>
-              <a:rPr lang="ru-RU" dirty="0" smtClean="0"/>
-              <a:t>Роль руководителя (разрешение конфликтов, передача опыта, мотивация).</a:t>
-            </a:r>
-          </a:p>
-          <a:p>
-            <a:pPr marL="514350" indent="-514350" algn="just">
-              <a:buFont typeface="+mj-lt"/>
-              <a:buAutoNum type="arabicPeriod"/>
-            </a:pPr>
-            <a:endParaRPr lang="ru-RU" dirty="0"/>
-          </a:p>
-        </p:txBody>
-      </p:sp>
-    </p:spTree>
-    <p:extLst>
-      <p:ext uri="{BB962C8B-B14F-4D97-AF65-F5344CB8AC3E}">
-        <p14:creationId xmlns:p14="http://schemas.microsoft.com/office/powerpoint/2010/main" val="3807888903"/>
       </p:ext>
     </p:extLst>
   </p:cSld>

</xml_diff>

<commit_message>
Added used literature list
</commit_message>
<xml_diff>
--- a/TeamManagement/Report.pptx
+++ b/TeamManagement/Report.pptx
@@ -5,7 +5,7 @@
     <p:sldMasterId id="2147483648" r:id="rId1"/>
   </p:sldMasterIdLst>
   <p:notesMasterIdLst>
-    <p:notesMasterId r:id="rId12"/>
+    <p:notesMasterId r:id="rId13"/>
   </p:notesMasterIdLst>
   <p:sldIdLst>
     <p:sldId id="256" r:id="rId2"/>
@@ -18,6 +18,7 @@
     <p:sldId id="265" r:id="rId9"/>
     <p:sldId id="260" r:id="rId10"/>
     <p:sldId id="261" r:id="rId11"/>
+    <p:sldId id="266" r:id="rId12"/>
   </p:sldIdLst>
   <p:sldSz cx="12192000" cy="6858000"/>
   <p:notesSz cx="6858000" cy="9144000"/>
@@ -206,7 +207,7 @@
           <a:p>
             <a:fld id="{B76B641F-C7E1-4E15-B56E-E525FA5EED94}" type="datetimeFigureOut">
               <a:rPr lang="ru-RU" smtClean="0"/>
-              <a:t>18.05.2025</a:t>
+              <a:t>25.05.2025</a:t>
             </a:fld>
             <a:endParaRPr lang="ru-RU"/>
           </a:p>
@@ -689,7 +690,7 @@
           <a:p>
             <a:fld id="{74D17070-512D-4E4F-98F9-DE4644DFEE47}" type="datetimeFigureOut">
               <a:rPr lang="ru-RU" smtClean="0"/>
-              <a:t>18.05.2025</a:t>
+              <a:t>25.05.2025</a:t>
             </a:fld>
             <a:endParaRPr lang="ru-RU"/>
           </a:p>
@@ -859,7 +860,7 @@
           <a:p>
             <a:fld id="{74D17070-512D-4E4F-98F9-DE4644DFEE47}" type="datetimeFigureOut">
               <a:rPr lang="ru-RU" smtClean="0"/>
-              <a:t>18.05.2025</a:t>
+              <a:t>25.05.2025</a:t>
             </a:fld>
             <a:endParaRPr lang="ru-RU"/>
           </a:p>
@@ -1039,7 +1040,7 @@
           <a:p>
             <a:fld id="{74D17070-512D-4E4F-98F9-DE4644DFEE47}" type="datetimeFigureOut">
               <a:rPr lang="ru-RU" smtClean="0"/>
-              <a:t>18.05.2025</a:t>
+              <a:t>25.05.2025</a:t>
             </a:fld>
             <a:endParaRPr lang="ru-RU"/>
           </a:p>
@@ -1209,7 +1210,7 @@
           <a:p>
             <a:fld id="{74D17070-512D-4E4F-98F9-DE4644DFEE47}" type="datetimeFigureOut">
               <a:rPr lang="ru-RU" smtClean="0"/>
-              <a:t>18.05.2025</a:t>
+              <a:t>25.05.2025</a:t>
             </a:fld>
             <a:endParaRPr lang="ru-RU"/>
           </a:p>
@@ -1455,7 +1456,7 @@
           <a:p>
             <a:fld id="{74D17070-512D-4E4F-98F9-DE4644DFEE47}" type="datetimeFigureOut">
               <a:rPr lang="ru-RU" smtClean="0"/>
-              <a:t>18.05.2025</a:t>
+              <a:t>25.05.2025</a:t>
             </a:fld>
             <a:endParaRPr lang="ru-RU"/>
           </a:p>
@@ -1687,7 +1688,7 @@
           <a:p>
             <a:fld id="{74D17070-512D-4E4F-98F9-DE4644DFEE47}" type="datetimeFigureOut">
               <a:rPr lang="ru-RU" smtClean="0"/>
-              <a:t>18.05.2025</a:t>
+              <a:t>25.05.2025</a:t>
             </a:fld>
             <a:endParaRPr lang="ru-RU"/>
           </a:p>
@@ -2054,7 +2055,7 @@
           <a:p>
             <a:fld id="{74D17070-512D-4E4F-98F9-DE4644DFEE47}" type="datetimeFigureOut">
               <a:rPr lang="ru-RU" smtClean="0"/>
-              <a:t>18.05.2025</a:t>
+              <a:t>25.05.2025</a:t>
             </a:fld>
             <a:endParaRPr lang="ru-RU"/>
           </a:p>
@@ -2172,7 +2173,7 @@
           <a:p>
             <a:fld id="{74D17070-512D-4E4F-98F9-DE4644DFEE47}" type="datetimeFigureOut">
               <a:rPr lang="ru-RU" smtClean="0"/>
-              <a:t>18.05.2025</a:t>
+              <a:t>25.05.2025</a:t>
             </a:fld>
             <a:endParaRPr lang="ru-RU"/>
           </a:p>
@@ -2267,7 +2268,7 @@
           <a:p>
             <a:fld id="{74D17070-512D-4E4F-98F9-DE4644DFEE47}" type="datetimeFigureOut">
               <a:rPr lang="ru-RU" smtClean="0"/>
-              <a:t>18.05.2025</a:t>
+              <a:t>25.05.2025</a:t>
             </a:fld>
             <a:endParaRPr lang="ru-RU"/>
           </a:p>
@@ -2544,7 +2545,7 @@
           <a:p>
             <a:fld id="{74D17070-512D-4E4F-98F9-DE4644DFEE47}" type="datetimeFigureOut">
               <a:rPr lang="ru-RU" smtClean="0"/>
-              <a:t>18.05.2025</a:t>
+              <a:t>25.05.2025</a:t>
             </a:fld>
             <a:endParaRPr lang="ru-RU"/>
           </a:p>
@@ -2797,7 +2798,7 @@
           <a:p>
             <a:fld id="{74D17070-512D-4E4F-98F9-DE4644DFEE47}" type="datetimeFigureOut">
               <a:rPr lang="ru-RU" smtClean="0"/>
-              <a:t>18.05.2025</a:t>
+              <a:t>25.05.2025</a:t>
             </a:fld>
             <a:endParaRPr lang="ru-RU"/>
           </a:p>
@@ -3010,7 +3011,7 @@
           <a:p>
             <a:fld id="{74D17070-512D-4E4F-98F9-DE4644DFEE47}" type="datetimeFigureOut">
               <a:rPr lang="ru-RU" smtClean="0"/>
-              <a:t>18.05.2025</a:t>
+              <a:t>25.05.2025</a:t>
             </a:fld>
             <a:endParaRPr lang="ru-RU"/>
           </a:p>
@@ -3904,6 +3905,210 @@
 </p:sld>
 </file>
 
+<file path=ppt/slides/slide11.xml><?xml version="1.0" encoding="utf-8"?>
+<p:sld xmlns:a="http://schemas.openxmlformats.org/drawingml/2006/main" xmlns:r="http://schemas.openxmlformats.org/officeDocument/2006/relationships" xmlns:p="http://schemas.openxmlformats.org/presentationml/2006/main">
+  <p:cSld>
+    <p:spTree>
+      <p:nvGrpSpPr>
+        <p:cNvPr id="1" name=""/>
+        <p:cNvGrpSpPr/>
+        <p:nvPr/>
+      </p:nvGrpSpPr>
+      <p:grpSpPr>
+        <a:xfrm>
+          <a:off x="0" y="0"/>
+          <a:ext cx="0" cy="0"/>
+          <a:chOff x="0" y="0"/>
+          <a:chExt cx="0" cy="0"/>
+        </a:xfrm>
+      </p:grpSpPr>
+      <p:sp>
+        <p:nvSpPr>
+          <p:cNvPr id="2" name="Title 1"/>
+          <p:cNvSpPr>
+            <a:spLocks noGrp="1"/>
+          </p:cNvSpPr>
+          <p:nvPr>
+            <p:ph type="title"/>
+          </p:nvPr>
+        </p:nvSpPr>
+        <p:spPr>
+          <a:xfrm>
+            <a:off x="838200" y="0"/>
+            <a:ext cx="10515600" cy="1325563"/>
+          </a:xfrm>
+        </p:spPr>
+        <p:txBody>
+          <a:bodyPr/>
+          <a:lstStyle/>
+          <a:p>
+            <a:pPr algn="ctr"/>
+            <a:r>
+              <a:rPr lang="ru-RU" dirty="0" smtClean="0"/>
+              <a:t>Использованные источники</a:t>
+            </a:r>
+            <a:endParaRPr lang="ru-RU" dirty="0"/>
+          </a:p>
+        </p:txBody>
+      </p:sp>
+      <p:sp>
+        <p:nvSpPr>
+          <p:cNvPr id="3" name="Content Placeholder 2"/>
+          <p:cNvSpPr>
+            <a:spLocks noGrp="1"/>
+          </p:cNvSpPr>
+          <p:nvPr>
+            <p:ph idx="1"/>
+          </p:nvPr>
+        </p:nvSpPr>
+        <p:spPr>
+          <a:xfrm>
+            <a:off x="838200" y="1325563"/>
+            <a:ext cx="10515600" cy="4851400"/>
+          </a:xfrm>
+        </p:spPr>
+        <p:txBody>
+          <a:bodyPr/>
+          <a:lstStyle/>
+          <a:p>
+            <a:pPr algn="just"/>
+            <a:r>
+              <a:rPr lang="ru-RU" dirty="0" err="1"/>
+              <a:t>Божукова</a:t>
+            </a:r>
+            <a:r>
+              <a:rPr lang="ru-RU" dirty="0"/>
+              <a:t> Е.М</a:t>
+            </a:r>
+            <a:r>
+              <a:rPr lang="ru-RU" dirty="0" smtClean="0"/>
+              <a:t>. </a:t>
+            </a:r>
+            <a:r>
+              <a:rPr lang="ru-RU" dirty="0"/>
+              <a:t>Управление трудовыми конфликтами в </a:t>
+            </a:r>
+            <a:r>
+              <a:rPr lang="ru-RU" dirty="0" smtClean="0"/>
+              <a:t>организации </a:t>
+            </a:r>
+            <a:r>
+              <a:rPr lang="en-US" dirty="0" smtClean="0"/>
+              <a:t>//</a:t>
+            </a:r>
+            <a:r>
+              <a:rPr lang="ru-RU" dirty="0" smtClean="0"/>
+              <a:t> «ИННОВАЦИИ </a:t>
+            </a:r>
+            <a:r>
+              <a:rPr lang="ru-RU" dirty="0"/>
+              <a:t>И ИНВЕСТИЦИИ». № 8. </a:t>
+            </a:r>
+            <a:r>
+              <a:rPr lang="ru-RU" dirty="0" smtClean="0"/>
+              <a:t>2019</a:t>
+            </a:r>
+          </a:p>
+          <a:p>
+            <a:pPr algn="just"/>
+            <a:r>
+              <a:rPr lang="en-US" dirty="0" smtClean="0"/>
+              <a:t>Henry Ford. My </a:t>
+            </a:r>
+            <a:r>
+              <a:rPr lang="en-US" dirty="0"/>
+              <a:t>Life and </a:t>
+            </a:r>
+            <a:r>
+              <a:rPr lang="en-US" dirty="0" smtClean="0"/>
+              <a:t>Work, Garden City Publishing Company 1922</a:t>
+            </a:r>
+            <a:endParaRPr lang="ru-RU" dirty="0" smtClean="0"/>
+          </a:p>
+          <a:p>
+            <a:pPr algn="just"/>
+            <a:r>
+              <a:rPr lang="ru-RU" dirty="0"/>
+              <a:t>Сорокина Н.Д. </a:t>
+            </a:r>
+            <a:r>
+              <a:rPr lang="ru-RU" dirty="0" err="1"/>
+              <a:t>Конфликтология</a:t>
+            </a:r>
+            <a:r>
+              <a:rPr lang="ru-RU" dirty="0"/>
+              <a:t>: современные подходы к управлению трудовыми </a:t>
+            </a:r>
+            <a:r>
+              <a:rPr lang="ru-RU" dirty="0" smtClean="0"/>
+              <a:t>конфликтами </a:t>
+            </a:r>
+            <a:r>
+              <a:rPr lang="en-US" dirty="0" smtClean="0"/>
+              <a:t>// </a:t>
+            </a:r>
+            <a:r>
+              <a:rPr lang="ru-RU" dirty="0"/>
+              <a:t>Управление </a:t>
+            </a:r>
+            <a:r>
+              <a:rPr lang="ru-RU" dirty="0" smtClean="0"/>
+              <a:t>персоналом 2012</a:t>
+            </a:r>
+          </a:p>
+          <a:p>
+            <a:pPr algn="just"/>
+            <a:r>
+              <a:rPr lang="ru-RU" dirty="0" err="1"/>
+              <a:t>Анцупов</a:t>
+            </a:r>
+            <a:r>
+              <a:rPr lang="ru-RU" dirty="0"/>
+              <a:t> А.Я., Шипилов </a:t>
+            </a:r>
+            <a:r>
+              <a:rPr lang="ru-RU" dirty="0" smtClean="0"/>
+              <a:t>А.И. </a:t>
+            </a:r>
+            <a:r>
+              <a:rPr lang="ru-RU" dirty="0" err="1" smtClean="0"/>
+              <a:t>Конфликтология</a:t>
+            </a:r>
+            <a:r>
+              <a:rPr lang="ru-RU" dirty="0"/>
+              <a:t>: Учебник для вузов. — М.: </a:t>
+            </a:r>
+            <a:r>
+              <a:rPr lang="ru-RU" dirty="0" smtClean="0"/>
+              <a:t>ЮНИТИ, 2000</a:t>
+            </a:r>
+            <a:r>
+              <a:rPr lang="ru-RU" dirty="0"/>
+              <a:t>. - 551 с.</a:t>
+            </a:r>
+          </a:p>
+        </p:txBody>
+      </p:sp>
+    </p:spTree>
+    <p:extLst>
+      <p:ext uri="{BB962C8B-B14F-4D97-AF65-F5344CB8AC3E}">
+        <p14:creationId xmlns:p14="http://schemas.microsoft.com/office/powerpoint/2010/main" val="3866080283"/>
+      </p:ext>
+    </p:extLst>
+  </p:cSld>
+  <p:clrMapOvr>
+    <a:masterClrMapping/>
+  </p:clrMapOvr>
+  <p:timing>
+    <p:tnLst>
+      <p:par>
+        <p:cTn id="1" dur="indefinite" restart="never" nodeType="tmRoot"/>
+      </p:par>
+    </p:tnLst>
+  </p:timing>
+</p:sld>
+</file>
+
 <file path=ppt/slides/slide2.xml><?xml version="1.0" encoding="utf-8"?>
 <p:sld xmlns:a="http://schemas.openxmlformats.org/drawingml/2006/main" xmlns:r="http://schemas.openxmlformats.org/officeDocument/2006/relationships" xmlns:p="http://schemas.openxmlformats.org/presentationml/2006/main">
   <p:cSld>
@@ -4625,7 +4830,6 @@
               <a:rPr lang="ru-RU" dirty="0"/>
               <a:t>Личностные (различия в характерах, ценностях).</a:t>
             </a:r>
-            <a:endParaRPr lang="ru-RU" dirty="0"/>
           </a:p>
           <a:p>
             <a:pPr marL="0" indent="0">
@@ -5419,7 +5623,6 @@
               <a:rPr lang="ru-RU" sz="2800" dirty="0"/>
               <a:t>эффективном управлении</a:t>
             </a:r>
-            <a:endParaRPr lang="ru-RU" sz="2800" dirty="0"/>
           </a:p>
         </p:txBody>
       </p:sp>

</xml_diff>